<commit_message>
add mongodb image to presentation
</commit_message>
<xml_diff>
--- a/documentation/Baddy_presentation_v3.pptx
+++ b/documentation/Baddy_presentation_v3.pptx
@@ -15630,8 +15630,8 @@
         </p:blipFill>
         <p:spPr bwMode="auto">
           <a:xfrm>
-            <a:off x="1010442" y="3910135"/>
-            <a:ext cx="1427990" cy="1770234"/>
+            <a:off x="632255" y="4311650"/>
+            <a:ext cx="1046958" cy="1297881"/>
           </a:xfrm>
           <a:prstGeom prst="rect">
             <a:avLst/>
@@ -15677,8 +15677,8 @@
         </p:blipFill>
         <p:spPr bwMode="auto">
           <a:xfrm>
-            <a:off x="4125390" y="4008732"/>
-            <a:ext cx="3066517" cy="1875600"/>
+            <a:off x="3039335" y="4462745"/>
+            <a:ext cx="2121975" cy="1297882"/>
           </a:xfrm>
           <a:prstGeom prst="rect">
             <a:avLst/>
@@ -15724,8 +15724,8 @@
         </p:blipFill>
         <p:spPr bwMode="auto">
           <a:xfrm>
-            <a:off x="7905903" y="3906746"/>
-            <a:ext cx="3858705" cy="1977586"/>
+            <a:off x="9332539" y="4336693"/>
+            <a:ext cx="2532455" cy="1297883"/>
           </a:xfrm>
           <a:prstGeom prst="rect">
             <a:avLst/>
@@ -15756,8 +15756,8 @@
         </p:nvSpPr>
         <p:spPr>
           <a:xfrm>
-            <a:off x="2862381" y="4008732"/>
-            <a:ext cx="906011" cy="1569660"/>
+            <a:off x="2014008" y="4431263"/>
+            <a:ext cx="906011" cy="1200329"/>
           </a:xfrm>
           <a:prstGeom prst="rect">
             <a:avLst/>
@@ -15771,7 +15771,7 @@
           <a:lstStyle/>
           <a:p>
             <a:r>
-              <a:rPr lang="it-IT" sz="9600" dirty="0"/>
+              <a:rPr lang="it-IT" sz="7200" dirty="0"/>
               <a:t>+</a:t>
             </a:r>
           </a:p>
@@ -15791,8 +15791,8 @@
         </p:nvSpPr>
         <p:spPr>
           <a:xfrm>
-            <a:off x="7286175" y="4110709"/>
-            <a:ext cx="906011" cy="1569660"/>
+            <a:off x="5415383" y="4336693"/>
+            <a:ext cx="906011" cy="1200329"/>
           </a:xfrm>
           <a:prstGeom prst="rect">
             <a:avLst/>
@@ -15806,7 +15806,72 @@
           <a:lstStyle/>
           <a:p>
             <a:r>
-              <a:rPr lang="it-IT" sz="9600" dirty="0"/>
+              <a:rPr lang="it-IT" sz="7200" dirty="0"/>
+              <a:t>+</a:t>
+            </a:r>
+          </a:p>
+        </p:txBody>
+      </p:sp>
+      <p:pic>
+        <p:nvPicPr>
+          <p:cNvPr id="6" name="Picture 5" descr="Logo&#10;&#10;Description automatically generated">
+            <a:extLst>
+              <a:ext uri="{FF2B5EF4-FFF2-40B4-BE49-F238E27FC236}">
+                <a16:creationId xmlns:a16="http://schemas.microsoft.com/office/drawing/2014/main" id="{2438E446-17D4-454D-BF03-67F6A46B1BFA}"/>
+              </a:ext>
+            </a:extLst>
+          </p:cNvPr>
+          <p:cNvPicPr>
+            <a:picLocks noChangeAspect="1"/>
+          </p:cNvPicPr>
+          <p:nvPr/>
+        </p:nvPicPr>
+        <p:blipFill>
+          <a:blip r:embed="rId5"/>
+          <a:stretch>
+            <a:fillRect/>
+          </a:stretch>
+        </p:blipFill>
+        <p:spPr>
+          <a:xfrm>
+            <a:off x="6321394" y="4585403"/>
+            <a:ext cx="2587641" cy="702907"/>
+          </a:xfrm>
+          <a:prstGeom prst="rect">
+            <a:avLst/>
+          </a:prstGeom>
+        </p:spPr>
+      </p:pic>
+      <p:sp>
+        <p:nvSpPr>
+          <p:cNvPr id="7" name="TextBox 6">
+            <a:extLst>
+              <a:ext uri="{FF2B5EF4-FFF2-40B4-BE49-F238E27FC236}">
+                <a16:creationId xmlns:a16="http://schemas.microsoft.com/office/drawing/2014/main" id="{BD77CB51-55FF-4672-A578-F1F78569FBB1}"/>
+              </a:ext>
+            </a:extLst>
+          </p:cNvPr>
+          <p:cNvSpPr txBox="1"/>
+          <p:nvPr/>
+        </p:nvSpPr>
+        <p:spPr>
+          <a:xfrm>
+            <a:off x="8914931" y="4360425"/>
+            <a:ext cx="728806" cy="1200329"/>
+          </a:xfrm>
+          <a:prstGeom prst="rect">
+            <a:avLst/>
+          </a:prstGeom>
+          <a:noFill/>
+        </p:spPr>
+        <p:txBody>
+          <a:bodyPr wrap="square" rtlCol="0">
+            <a:spAutoFit/>
+          </a:bodyPr>
+          <a:lstStyle/>
+          <a:p>
+            <a:r>
+              <a:rPr lang="en-US" sz="7200" dirty="0"/>
               <a:t>+</a:t>
             </a:r>
           </a:p>

</xml_diff>